<commit_message>
submitted MLND capstone project for 3rd review
</commit_message>
<xml_diff>
--- a/projects/facial_recognition_family_members/Supporting_Figures.pptx
+++ b/projects/facial_recognition_family_members/Supporting_Figures.pptx
@@ -107,6 +107,11 @@
       </a:defRPr>
     </a:lvl9pPr>
   </p:defaultTextStyle>
+  <p:extLst>
+    <p:ext uri="{EFAFB233-063F-42B5-8137-9DF3F51BA10A}">
+      <p15:sldGuideLst xmlns:p15="http://schemas.microsoft.com/office/powerpoint/2012/main"/>
+    </p:ext>
+  </p:extLst>
 </p:presentation>
 </file>
 
@@ -6201,7 +6206,7 @@
           <a:p>
             <a:fld id="{8FFC8F48-6D87-4645-974F-1D48F8BD7F32}" type="datetimeFigureOut">
               <a:rPr lang="en-SG" smtClean="0"/>
-              <a:t>21/1/2018</a:t>
+              <a:t>30/1/18</a:t>
             </a:fld>
             <a:endParaRPr lang="en-SG"/>
           </a:p>
@@ -6401,7 +6406,7 @@
           <a:p>
             <a:fld id="{8FFC8F48-6D87-4645-974F-1D48F8BD7F32}" type="datetimeFigureOut">
               <a:rPr lang="en-SG" smtClean="0"/>
-              <a:t>21/1/2018</a:t>
+              <a:t>30/1/18</a:t>
             </a:fld>
             <a:endParaRPr lang="en-SG"/>
           </a:p>
@@ -6611,7 +6616,7 @@
           <a:p>
             <a:fld id="{8FFC8F48-6D87-4645-974F-1D48F8BD7F32}" type="datetimeFigureOut">
               <a:rPr lang="en-SG" smtClean="0"/>
-              <a:t>21/1/2018</a:t>
+              <a:t>30/1/18</a:t>
             </a:fld>
             <a:endParaRPr lang="en-SG"/>
           </a:p>
@@ -6811,7 +6816,7 @@
           <a:p>
             <a:fld id="{8FFC8F48-6D87-4645-974F-1D48F8BD7F32}" type="datetimeFigureOut">
               <a:rPr lang="en-SG" smtClean="0"/>
-              <a:t>21/1/2018</a:t>
+              <a:t>30/1/18</a:t>
             </a:fld>
             <a:endParaRPr lang="en-SG"/>
           </a:p>
@@ -7087,7 +7092,7 @@
           <a:p>
             <a:fld id="{8FFC8F48-6D87-4645-974F-1D48F8BD7F32}" type="datetimeFigureOut">
               <a:rPr lang="en-SG" smtClean="0"/>
-              <a:t>21/1/2018</a:t>
+              <a:t>30/1/18</a:t>
             </a:fld>
             <a:endParaRPr lang="en-SG"/>
           </a:p>
@@ -7355,7 +7360,7 @@
           <a:p>
             <a:fld id="{8FFC8F48-6D87-4645-974F-1D48F8BD7F32}" type="datetimeFigureOut">
               <a:rPr lang="en-SG" smtClean="0"/>
-              <a:t>21/1/2018</a:t>
+              <a:t>30/1/18</a:t>
             </a:fld>
             <a:endParaRPr lang="en-SG"/>
           </a:p>
@@ -7770,7 +7775,7 @@
           <a:p>
             <a:fld id="{8FFC8F48-6D87-4645-974F-1D48F8BD7F32}" type="datetimeFigureOut">
               <a:rPr lang="en-SG" smtClean="0"/>
-              <a:t>21/1/2018</a:t>
+              <a:t>30/1/18</a:t>
             </a:fld>
             <a:endParaRPr lang="en-SG"/>
           </a:p>
@@ -7912,7 +7917,7 @@
           <a:p>
             <a:fld id="{8FFC8F48-6D87-4645-974F-1D48F8BD7F32}" type="datetimeFigureOut">
               <a:rPr lang="en-SG" smtClean="0"/>
-              <a:t>21/1/2018</a:t>
+              <a:t>30/1/18</a:t>
             </a:fld>
             <a:endParaRPr lang="en-SG"/>
           </a:p>
@@ -8025,7 +8030,7 @@
           <a:p>
             <a:fld id="{8FFC8F48-6D87-4645-974F-1D48F8BD7F32}" type="datetimeFigureOut">
               <a:rPr lang="en-SG" smtClean="0"/>
-              <a:t>21/1/2018</a:t>
+              <a:t>30/1/18</a:t>
             </a:fld>
             <a:endParaRPr lang="en-SG"/>
           </a:p>
@@ -8338,7 +8343,7 @@
           <a:p>
             <a:fld id="{8FFC8F48-6D87-4645-974F-1D48F8BD7F32}" type="datetimeFigureOut">
               <a:rPr lang="en-SG" smtClean="0"/>
-              <a:t>21/1/2018</a:t>
+              <a:t>30/1/18</a:t>
             </a:fld>
             <a:endParaRPr lang="en-SG"/>
           </a:p>
@@ -8627,7 +8632,7 @@
           <a:p>
             <a:fld id="{8FFC8F48-6D87-4645-974F-1D48F8BD7F32}" type="datetimeFigureOut">
               <a:rPr lang="en-SG" smtClean="0"/>
-              <a:t>21/1/2018</a:t>
+              <a:t>30/1/18</a:t>
             </a:fld>
             <a:endParaRPr lang="en-SG"/>
           </a:p>
@@ -8870,7 +8875,7 @@
           <a:p>
             <a:fld id="{8FFC8F48-6D87-4645-974F-1D48F8BD7F32}" type="datetimeFigureOut">
               <a:rPr lang="en-SG" smtClean="0"/>
-              <a:t>21/1/2018</a:t>
+              <a:t>30/1/18</a:t>
             </a:fld>
             <a:endParaRPr lang="en-SG"/>
           </a:p>
@@ -9453,56 +9458,6 @@
           <a:chExt cx="0" cy="0"/>
         </a:xfrm>
       </p:grpSpPr>
-      <p:sp>
-        <p:nvSpPr>
-          <p:cNvPr id="2" name="Title 1">
-            <a:extLst>
-              <a:ext uri="{FF2B5EF4-FFF2-40B4-BE49-F238E27FC236}">
-                <a16:creationId xmlns:a16="http://schemas.microsoft.com/office/drawing/2014/main" id="{0E195638-350A-492D-B6F6-1F3F1CFEADAF}"/>
-              </a:ext>
-            </a:extLst>
-          </p:cNvPr>
-          <p:cNvSpPr>
-            <a:spLocks noGrp="1"/>
-          </p:cNvSpPr>
-          <p:nvPr>
-            <p:ph type="title"/>
-          </p:nvPr>
-        </p:nvSpPr>
-        <p:spPr/>
-        <p:txBody>
-          <a:bodyPr/>
-          <a:lstStyle/>
-          <a:p>
-            <a:endParaRPr lang="en-SG"/>
-          </a:p>
-        </p:txBody>
-      </p:sp>
-      <p:sp>
-        <p:nvSpPr>
-          <p:cNvPr id="6" name="Content Placeholder 5">
-            <a:extLst>
-              <a:ext uri="{FF2B5EF4-FFF2-40B4-BE49-F238E27FC236}">
-                <a16:creationId xmlns:a16="http://schemas.microsoft.com/office/drawing/2014/main" id="{9FFE3D02-305B-4441-9702-1646628690ED}"/>
-              </a:ext>
-            </a:extLst>
-          </p:cNvPr>
-          <p:cNvSpPr>
-            <a:spLocks noGrp="1"/>
-          </p:cNvSpPr>
-          <p:nvPr>
-            <p:ph idx="1"/>
-          </p:nvPr>
-        </p:nvSpPr>
-        <p:spPr/>
-        <p:txBody>
-          <a:bodyPr/>
-          <a:lstStyle/>
-          <a:p>
-            <a:endParaRPr lang="en-SG"/>
-          </a:p>
-        </p:txBody>
-      </p:sp>
       <p:pic>
         <p:nvPicPr>
           <p:cNvPr id="1030" name="Picture 6" descr="https://cdn-images-1.medium.com/max/2000/1*c26y0guGmtvnskiBFujA_w.png">
@@ -9628,6 +9583,145 @@
                 </a:solidFill>
               </a:rPr>
               <a:t>Target Layer</a:t>
+            </a:r>
+            <a:endParaRPr lang="en-SG" dirty="0">
+              <a:solidFill>
+                <a:srgbClr val="FF0000"/>
+              </a:solidFill>
+            </a:endParaRPr>
+          </a:p>
+        </p:txBody>
+      </p:sp>
+      <p:sp>
+        <p:nvSpPr>
+          <p:cNvPr id="3" name="Rounded Rectangle 2">
+            <a:extLst>
+              <a:ext uri="{FF2B5EF4-FFF2-40B4-BE49-F238E27FC236}">
+                <a16:creationId xmlns:a16="http://schemas.microsoft.com/office/drawing/2014/main" id="{10382D89-DDBA-DA4B-981B-3DBCABC2FC0E}"/>
+              </a:ext>
+            </a:extLst>
+          </p:cNvPr>
+          <p:cNvSpPr/>
+          <p:nvPr/>
+        </p:nvSpPr>
+        <p:spPr>
+          <a:xfrm>
+            <a:off x="6578353" y="2201662"/>
+            <a:ext cx="958789" cy="1553592"/>
+          </a:xfrm>
+          <a:prstGeom prst="roundRect">
+            <a:avLst/>
+          </a:prstGeom>
+          <a:noFill/>
+          <a:ln>
+            <a:solidFill>
+              <a:srgbClr val="FF0000"/>
+            </a:solidFill>
+          </a:ln>
+        </p:spPr>
+        <p:style>
+          <a:lnRef idx="2">
+            <a:schemeClr val="accent1">
+              <a:shade val="50000"/>
+            </a:schemeClr>
+          </a:lnRef>
+          <a:fillRef idx="1">
+            <a:schemeClr val="accent1"/>
+          </a:fillRef>
+          <a:effectRef idx="0">
+            <a:schemeClr val="accent1"/>
+          </a:effectRef>
+          <a:fontRef idx="minor">
+            <a:schemeClr val="lt1"/>
+          </a:fontRef>
+        </p:style>
+        <p:txBody>
+          <a:bodyPr rtlCol="0" anchor="ctr"/>
+          <a:lstStyle/>
+          <a:p>
+            <a:pPr algn="ctr"/>
+            <a:endParaRPr lang="en-US"/>
+          </a:p>
+        </p:txBody>
+      </p:sp>
+      <p:cxnSp>
+        <p:nvCxnSpPr>
+          <p:cNvPr id="10" name="Straight Arrow Connector 9">
+            <a:extLst>
+              <a:ext uri="{FF2B5EF4-FFF2-40B4-BE49-F238E27FC236}">
+                <a16:creationId xmlns:a16="http://schemas.microsoft.com/office/drawing/2014/main" id="{E328BF5E-B6C9-3246-94E9-47671186BE41}"/>
+              </a:ext>
+            </a:extLst>
+          </p:cNvPr>
+          <p:cNvCxnSpPr/>
+          <p:nvPr/>
+        </p:nvCxnSpPr>
+        <p:spPr>
+          <a:xfrm>
+            <a:off x="7057110" y="3815071"/>
+            <a:ext cx="0" cy="595223"/>
+          </a:xfrm>
+          <a:prstGeom prst="straightConnector1">
+            <a:avLst/>
+          </a:prstGeom>
+          <a:ln>
+            <a:solidFill>
+              <a:srgbClr val="FF0000"/>
+            </a:solidFill>
+            <a:headEnd type="triangle"/>
+            <a:tailEnd type="none"/>
+          </a:ln>
+        </p:spPr>
+        <p:style>
+          <a:lnRef idx="1">
+            <a:schemeClr val="accent1"/>
+          </a:lnRef>
+          <a:fillRef idx="0">
+            <a:schemeClr val="accent1"/>
+          </a:fillRef>
+          <a:effectRef idx="0">
+            <a:schemeClr val="accent1"/>
+          </a:effectRef>
+          <a:fontRef idx="minor">
+            <a:schemeClr val="tx1"/>
+          </a:fontRef>
+        </p:style>
+      </p:cxnSp>
+      <p:sp>
+        <p:nvSpPr>
+          <p:cNvPr id="11" name="TextBox 10">
+            <a:extLst>
+              <a:ext uri="{FF2B5EF4-FFF2-40B4-BE49-F238E27FC236}">
+                <a16:creationId xmlns:a16="http://schemas.microsoft.com/office/drawing/2014/main" id="{16B05E27-01FC-6848-8C25-40437A600D83}"/>
+              </a:ext>
+            </a:extLst>
+          </p:cNvPr>
+          <p:cNvSpPr txBox="1"/>
+          <p:nvPr/>
+        </p:nvSpPr>
+        <p:spPr>
+          <a:xfrm>
+            <a:off x="6129323" y="4410294"/>
+            <a:ext cx="1855573" cy="369332"/>
+          </a:xfrm>
+          <a:prstGeom prst="rect">
+            <a:avLst/>
+          </a:prstGeom>
+          <a:noFill/>
+        </p:spPr>
+        <p:txBody>
+          <a:bodyPr wrap="none" rtlCol="0">
+            <a:spAutoFit/>
+          </a:bodyPr>
+          <a:lstStyle/>
+          <a:p>
+            <a:r>
+              <a:rPr lang="en-US" dirty="0">
+                <a:solidFill>
+                  <a:srgbClr val="FF0000"/>
+                </a:solidFill>
+              </a:rPr>
+              <a:t>Inception Module</a:t>
             </a:r>
             <a:endParaRPr lang="en-SG" dirty="0">
               <a:solidFill>

</xml_diff>